<commit_message>
Nambahin laporan sama DDL
</commit_message>
<xml_diff>
--- a/Sisfo Kontrol - v1.0.pptx
+++ b/Sisfo Kontrol - v1.0.pptx
@@ -1949,7 +1949,7 @@
           <a:p>
             <a:fld id="{5391A52F-8F0A-4D9A-8768-E0AA67AA0B11}" type="datetimeFigureOut">
               <a:rPr lang="en-US" smtClean="0"/>
-              <a:t>10/10/2014</a:t>
+              <a:t>11/17/2014</a:t>
             </a:fld>
             <a:endParaRPr lang="en-US"/>
           </a:p>
@@ -2130,7 +2130,7 @@
           <a:p>
             <a:fld id="{5391A52F-8F0A-4D9A-8768-E0AA67AA0B11}" type="datetimeFigureOut">
               <a:rPr lang="en-US" smtClean="0"/>
-              <a:t>10/10/2014</a:t>
+              <a:t>11/17/2014</a:t>
             </a:fld>
             <a:endParaRPr lang="en-US"/>
           </a:p>
@@ -2281,7 +2281,7 @@
           <a:p>
             <a:fld id="{5391A52F-8F0A-4D9A-8768-E0AA67AA0B11}" type="datetimeFigureOut">
               <a:rPr lang="en-US" smtClean="0"/>
-              <a:t>10/10/2014</a:t>
+              <a:t>11/17/2014</a:t>
             </a:fld>
             <a:endParaRPr lang="en-US"/>
           </a:p>
@@ -4107,7 +4107,7 @@
           <a:p>
             <a:fld id="{5391A52F-8F0A-4D9A-8768-E0AA67AA0B11}" type="datetimeFigureOut">
               <a:rPr lang="en-US" smtClean="0"/>
-              <a:t>10/10/2014</a:t>
+              <a:t>11/17/2014</a:t>
             </a:fld>
             <a:endParaRPr lang="en-US"/>
           </a:p>
@@ -5977,7 +5977,7 @@
           <a:p>
             <a:fld id="{5391A52F-8F0A-4D9A-8768-E0AA67AA0B11}" type="datetimeFigureOut">
               <a:rPr lang="en-US" smtClean="0"/>
-              <a:t>10/10/2014</a:t>
+              <a:t>11/17/2014</a:t>
             </a:fld>
             <a:endParaRPr lang="en-US"/>
           </a:p>
@@ -6090,7 +6090,7 @@
           <a:p>
             <a:fld id="{5391A52F-8F0A-4D9A-8768-E0AA67AA0B11}" type="datetimeFigureOut">
               <a:rPr lang="en-US" smtClean="0"/>
-              <a:t>10/10/2014</a:t>
+              <a:t>11/17/2014</a:t>
             </a:fld>
             <a:endParaRPr lang="en-US"/>
           </a:p>
@@ -6631,7 +6631,7 @@
           <a:p>
             <a:fld id="{5391A52F-8F0A-4D9A-8768-E0AA67AA0B11}" type="datetimeFigureOut">
               <a:rPr lang="en-US" smtClean="0"/>
-              <a:t>10/10/2014</a:t>
+              <a:t>11/17/2014</a:t>
             </a:fld>
             <a:endParaRPr lang="en-US"/>
           </a:p>
@@ -6744,7 +6744,7 @@
           <a:p>
             <a:fld id="{5391A52F-8F0A-4D9A-8768-E0AA67AA0B11}" type="datetimeFigureOut">
               <a:rPr lang="en-US" smtClean="0"/>
-              <a:t>10/10/2014</a:t>
+              <a:t>11/17/2014</a:t>
             </a:fld>
             <a:endParaRPr lang="en-US"/>
           </a:p>
@@ -8455,7 +8455,7 @@
           <a:p>
             <a:fld id="{5391A52F-8F0A-4D9A-8768-E0AA67AA0B11}" type="datetimeFigureOut">
               <a:rPr lang="en-US" smtClean="0"/>
-              <a:t>10/10/2014</a:t>
+              <a:t>11/17/2014</a:t>
             </a:fld>
             <a:endParaRPr lang="en-US"/>
           </a:p>
@@ -8606,7 +8606,7 @@
           <a:p>
             <a:fld id="{5391A52F-8F0A-4D9A-8768-E0AA67AA0B11}" type="datetimeFigureOut">
               <a:rPr lang="en-US" smtClean="0"/>
-              <a:t>10/10/2014</a:t>
+              <a:t>11/17/2014</a:t>
             </a:fld>
             <a:endParaRPr lang="en-US"/>
           </a:p>
@@ -12221,7 +12221,7 @@
           <a:p>
             <a:fld id="{5391A52F-8F0A-4D9A-8768-E0AA67AA0B11}" type="datetimeFigureOut">
               <a:rPr lang="en-US" smtClean="0"/>
-              <a:t>10/10/2014</a:t>
+              <a:t>11/17/2014</a:t>
             </a:fld>
             <a:endParaRPr lang="en-US"/>
           </a:p>
@@ -14080,7 +14080,7 @@
           <a:p>
             <a:fld id="{5391A52F-8F0A-4D9A-8768-E0AA67AA0B11}" type="datetimeFigureOut">
               <a:rPr lang="en-US" smtClean="0"/>
-              <a:t>10/10/2014</a:t>
+              <a:t>11/17/2014</a:t>
             </a:fld>
             <a:endParaRPr lang="en-US"/>
           </a:p>
@@ -14620,10 +14620,6 @@
               <a:rPr lang="en-US" dirty="0" smtClean="0"/>
               <a:t>Oil Movement Control</a:t>
             </a:r>
-            <a:r>
-              <a:rPr lang="en-US" dirty="0" smtClean="0"/>
-              <a:t/>
-            </a:r>
             <a:br>
               <a:rPr lang="en-US" dirty="0" smtClean="0"/>
             </a:br>
@@ -14820,15 +14816,7 @@
             </a:r>
             <a:r>
               <a:rPr lang="en-US" dirty="0" smtClean="0"/>
-              <a:t> 1 barrel = </a:t>
-            </a:r>
-            <a:r>
-              <a:rPr lang="en-US" dirty="0" smtClean="0"/>
-              <a:t>1000 </a:t>
-            </a:r>
-            <a:r>
-              <a:rPr lang="en-US" dirty="0" smtClean="0"/>
-              <a:t>liter</a:t>
+              <a:t> 1 barrel = 1000 liter</a:t>
             </a:r>
             <a:endParaRPr lang="en-US" dirty="0"/>
           </a:p>
@@ -14864,11 +14852,7 @@
             </a:r>
             <a:r>
               <a:rPr lang="en-US" dirty="0" err="1" smtClean="0"/>
-              <a:t>B</a:t>
-            </a:r>
-            <a:r>
-              <a:rPr lang="en-US" dirty="0" err="1" smtClean="0"/>
-              <a:t>arang</a:t>
+              <a:t>Barang</a:t>
             </a:r>
             <a:endParaRPr lang="en-US" dirty="0"/>
           </a:p>
@@ -15539,99 +15523,90 @@
               <a:t> </a:t>
             </a:r>
             <a:r>
-              <a:rPr lang="en-US" dirty="0" err="1" smtClean="0"/>
-              <a:t>dapat</a:t>
-            </a:r>
-            <a:r>
-              <a:rPr lang="en-US" dirty="0" smtClean="0"/>
+              <a:rPr lang="en-US" dirty="0" err="1"/>
+              <a:t>dapatmengubah</a:t>
+            </a:r>
+            <a:r>
+              <a:rPr lang="en-US" dirty="0"/>
               <a:t> </a:t>
             </a:r>
             <a:r>
-              <a:rPr lang="en-US" dirty="0" err="1" smtClean="0"/>
-              <a:t>mengubah</a:t>
-            </a:r>
-            <a:r>
-              <a:rPr lang="en-US" dirty="0" smtClean="0"/>
+              <a:rPr lang="en-US" dirty="0" err="1"/>
+              <a:t>stok</a:t>
+            </a:r>
+            <a:r>
+              <a:rPr lang="en-US" dirty="0"/>
+              <a:t> yang </a:t>
+            </a:r>
+            <a:r>
+              <a:rPr lang="en-US" dirty="0" err="1"/>
+              <a:t>ada</a:t>
+            </a:r>
+            <a:r>
+              <a:rPr lang="en-US" dirty="0"/>
+              <a:t> di </a:t>
+            </a:r>
+            <a:r>
+              <a:rPr lang="en-US" dirty="0" err="1"/>
+              <a:t>tabel</a:t>
+            </a:r>
+            <a:r>
+              <a:rPr lang="en-US" dirty="0"/>
               <a:t> </a:t>
             </a:r>
             <a:r>
-              <a:rPr lang="en-US" dirty="0" err="1" smtClean="0"/>
-              <a:t>stok</a:t>
-            </a:r>
-            <a:r>
-              <a:rPr lang="en-US" dirty="0" smtClean="0"/>
-              <a:t> yang </a:t>
-            </a:r>
-            <a:r>
-              <a:rPr lang="en-US" dirty="0" err="1" smtClean="0"/>
-              <a:t>ada</a:t>
-            </a:r>
-            <a:r>
-              <a:rPr lang="en-US" dirty="0" smtClean="0"/>
-              <a:t> di </a:t>
-            </a:r>
-            <a:r>
-              <a:rPr lang="en-US" dirty="0" err="1" smtClean="0"/>
-              <a:t>tabel</a:t>
-            </a:r>
-            <a:r>
-              <a:rPr lang="en-US" dirty="0" smtClean="0"/>
-              <a:t> </a:t>
-            </a:r>
-            <a:r>
-              <a:rPr lang="en-US" dirty="0" err="1" smtClean="0"/>
+              <a:rPr lang="en-US" dirty="0" err="1"/>
               <a:t>tersebut</a:t>
             </a:r>
             <a:r>
-              <a:rPr lang="en-US" dirty="0" smtClean="0"/>
+              <a:rPr lang="en-US" dirty="0"/>
               <a:t>.</a:t>
             </a:r>
           </a:p>
           <a:p>
             <a:r>
-              <a:rPr lang="en-US" dirty="0" smtClean="0"/>
+              <a:rPr lang="en-US" dirty="0"/>
               <a:t>Customer </a:t>
             </a:r>
             <a:r>
-              <a:rPr lang="en-US" dirty="0" err="1" smtClean="0"/>
+              <a:rPr lang="en-US" dirty="0" err="1"/>
               <a:t>bisa</a:t>
             </a:r>
             <a:r>
-              <a:rPr lang="en-US" dirty="0" smtClean="0"/>
+              <a:rPr lang="en-US" dirty="0"/>
               <a:t> </a:t>
             </a:r>
             <a:r>
-              <a:rPr lang="en-US" dirty="0" err="1" smtClean="0"/>
+              <a:rPr lang="en-US" dirty="0" err="1"/>
               <a:t>mengubah</a:t>
             </a:r>
             <a:r>
-              <a:rPr lang="en-US" dirty="0" smtClean="0"/>
+              <a:rPr lang="en-US" dirty="0"/>
               <a:t> </a:t>
             </a:r>
             <a:r>
-              <a:rPr lang="en-US" dirty="0" err="1" smtClean="0"/>
+              <a:rPr lang="en-US" dirty="0" err="1"/>
               <a:t>statusnya</a:t>
             </a:r>
             <a:r>
-              <a:rPr lang="en-US" dirty="0" smtClean="0"/>
+              <a:rPr lang="en-US" dirty="0"/>
               <a:t>, </a:t>
             </a:r>
             <a:r>
-              <a:rPr lang="en-US" dirty="0" err="1" smtClean="0"/>
+              <a:rPr lang="en-US" dirty="0" err="1"/>
               <a:t>memberikan</a:t>
             </a:r>
             <a:r>
-              <a:rPr lang="en-US" dirty="0" smtClean="0"/>
+              <a:rPr lang="en-US" dirty="0"/>
               <a:t> </a:t>
             </a:r>
             <a:r>
               <a:rPr lang="en-US" dirty="0" err="1"/>
-              <a:t>k</a:t>
-            </a:r>
-            <a:r>
-              <a:rPr lang="en-US" dirty="0" err="1" smtClean="0"/>
-              <a:t>onfirmasi</a:t>
-            </a:r>
+              <a:t>konfirmasi</a:t>
+            </a:r>
+            <a:endParaRPr lang="en-US" dirty="0"/>
+          </a:p>
+          <a:p>
             <a:endParaRPr lang="en-US" dirty="0"/>
           </a:p>
         </p:txBody>

</xml_diff>